<commit_message>
modified readme with details for today's lesson
</commit_message>
<xml_diff>
--- a/Classification/classification.pptx
+++ b/Classification/classification.pptx
@@ -6409,12 +6409,18 @@
               <a:t>vector </a:t>
             </a:r>
             <a:r>
-              <a:rPr lang="en-US" dirty="0" err="1"/>
-              <a:t>machinesWhere</a:t>
+              <a:rPr lang="en-US" dirty="0" smtClean="0"/>
+              <a:t>machines</a:t>
+            </a:r>
+          </a:p>
+          <a:p>
+            <a:r>
+              <a:rPr lang="en-US" dirty="0" smtClean="0"/>
+              <a:t>Where </a:t>
             </a:r>
             <a:r>
               <a:rPr lang="en-US" dirty="0"/>
-              <a:t> to go from here</a:t>
+              <a:t>to go from here</a:t>
             </a:r>
           </a:p>
         </p:txBody>
@@ -6481,7 +6487,12 @@
             <p:ph idx="1"/>
           </p:nvPr>
         </p:nvSpPr>
-        <p:spPr/>
+        <p:spPr>
+          <a:xfrm>
+            <a:off x="677334" y="1591877"/>
+            <a:ext cx="8596668" cy="4039489"/>
+          </a:xfrm>
+        </p:spPr>
         <p:txBody>
           <a:bodyPr>
             <a:normAutofit/>
@@ -6517,7 +6528,15 @@
             <a:pPr lvl="1"/>
             <a:r>
               <a:rPr lang="en-US" dirty="0"/>
-              <a:t>Target (t). These represent the “answers” to training</a:t>
+              <a:t>Target </a:t>
+            </a:r>
+            <a:r>
+              <a:rPr lang="en-US" dirty="0" smtClean="0"/>
+              <a:t>(y). </a:t>
+            </a:r>
+            <a:r>
+              <a:rPr lang="en-US" dirty="0"/>
+              <a:t>These represent the “answers” to training</a:t>
             </a:r>
           </a:p>
           <a:p>

</xml_diff>